<commit_message>
updates to presentation and new codes
</commit_message>
<xml_diff>
--- a/Object-Oriented Programming - Huseyin Ergin.pptx
+++ b/Object-Oriented Programming - Huseyin Ergin.pptx
@@ -271,7 +271,7 @@
             <a:fld id="{DF92C6A9-E6DD-4FC7-8E96-F4F3489EB816}" type="datetimeFigureOut">
               <a:rPr lang="en-US" smtClean="0"/>
               <a:pPr/>
-              <a:t>3/25/2017</a:t>
+              <a:t>8/28/2018</a:t>
             </a:fld>
             <a:endParaRPr lang="en-CA" dirty="0"/>
           </a:p>
@@ -27908,7 +27908,7 @@
         </p:nvSpPr>
         <p:spPr>
           <a:xfrm>
-            <a:off x="4724400" y="2602947"/>
+            <a:off x="4724400" y="2590800"/>
             <a:ext cx="3371912" cy="703282"/>
           </a:xfrm>
           <a:prstGeom prst="rect">
@@ -28817,7 +28817,7 @@
         </p:blipFill>
         <p:spPr>
           <a:xfrm>
-            <a:off x="2509837" y="3657600"/>
+            <a:off x="2514600" y="3657600"/>
             <a:ext cx="4124325" cy="2428875"/>
           </a:xfrm>
           <a:prstGeom prst="rect">

</xml_diff>